<commit_message>
add note about server.php
</commit_message>
<xml_diff>
--- a/wordcamp-greece.pptx
+++ b/wordcamp-greece.pptx
@@ -3637,8 +3637,8 @@
         </p:nvSpPr>
         <p:spPr>
           <a:xfrm>
-            <a:off x="974409" y="3720313"/>
-            <a:ext cx="10546080" cy="1077218"/>
+            <a:off x="974409" y="3161429"/>
+            <a:ext cx="10546080" cy="2616101"/>
           </a:xfrm>
           <a:prstGeom prst="rect">
             <a:avLst/>
@@ -3651,34 +3651,39 @@
           </a:bodyPr>
           <a:lstStyle/>
           <a:p>
+            <a:pPr algn="ctr"/>
             <a:endParaRPr lang="en-GB" sz="3200" dirty="0">
               <a:solidFill>
                 <a:schemeClr val="bg1"/>
               </a:solidFill>
-              <a:latin typeface="Segoe UI" panose="020B0502040204020203" pitchFamily="34" charset="0"/>
+              <a:latin typeface="Avenir Next LT Pro" panose="020B0504020202020204" pitchFamily="34" charset="0"/>
               <a:cs typeface="Segoe UI" panose="020B0502040204020203" pitchFamily="34" charset="0"/>
             </a:endParaRPr>
           </a:p>
           <a:p>
-            <a:r>
-              <a:rPr lang="en-GB" sz="3200" dirty="0">
+            <a:pPr algn="ctr"/>
+            <a:r>
+              <a:rPr lang="en-GB" sz="4400" dirty="0">
                 <a:solidFill>
                   <a:schemeClr val="bg1"/>
                 </a:solidFill>
-                <a:latin typeface="Segoe UI" panose="020B0502040204020203" pitchFamily="34" charset="0"/>
+                <a:latin typeface="Avenir Next LT Pro" panose="020B0504020202020204" pitchFamily="34" charset="0"/>
                 <a:cs typeface="Segoe UI" panose="020B0502040204020203" pitchFamily="34" charset="0"/>
               </a:rPr>
-              <a:t>For all resources please go to </a:t>
-            </a:r>
-            <a:r>
-              <a:rPr lang="en-GB" sz="3200" b="1" dirty="0">
+              <a:t>For all resources please go to:</a:t>
+            </a:r>
+          </a:p>
+          <a:p>
+            <a:pPr algn="ctr"/>
+            <a:r>
+              <a:rPr lang="en-GB" sz="8800" dirty="0">
                 <a:solidFill>
                   <a:schemeClr val="bg1"/>
                 </a:solidFill>
-                <a:latin typeface="Segoe UI" panose="020B0502040204020203" pitchFamily="34" charset="0"/>
+                <a:latin typeface="Avenir Next LT Pro" panose="020B0504020202020204" pitchFamily="34" charset="0"/>
                 <a:cs typeface="Segoe UI" panose="020B0502040204020203" pitchFamily="34" charset="0"/>
               </a:rPr>
-              <a:t>https://wpjs.co.uk/greece</a:t>
+              <a:t> wpjs.co.uk/greece</a:t>
             </a:r>
           </a:p>
         </p:txBody>
@@ -3697,7 +3702,7 @@
         </p:nvSpPr>
         <p:spPr>
           <a:xfrm>
-            <a:off x="4533899" y="5471158"/>
+            <a:off x="4323398" y="5713912"/>
             <a:ext cx="3848101" cy="923330"/>
           </a:xfrm>
           <a:prstGeom prst="rect">

</xml_diff>